<commit_message>
introduction of the brs
</commit_message>
<xml_diff>
--- a/VEEPortingGuide/images/display_modes_nocustom.pptx
+++ b/VEEPortingGuide/images/display_modes_nocustom.pptx
@@ -6,6 +6,7 @@
   </p:sldMasterIdLst>
   <p:sldIdLst>
     <p:sldId id="256" r:id="rId2"/>
+    <p:sldId id="257" r:id="rId3"/>
   </p:sldIdLst>
   <p:sldSz cx="18288000" cy="18288000"/>
   <p:notesSz cx="6858000" cy="9144000"/>
@@ -243,7 +244,7 @@
           <a:p>
             <a:fld id="{B0B69CF3-5B14-48D7-B161-C10A5429FF4B}" type="datetimeFigureOut">
               <a:rPr lang="en-US" smtClean="0"/>
-              <a:t>10-Dec-20</a:t>
+              <a:t>24/02/01</a:t>
             </a:fld>
             <a:endParaRPr lang="en-US"/>
           </a:p>
@@ -413,7 +414,7 @@
           <a:p>
             <a:fld id="{B0B69CF3-5B14-48D7-B161-C10A5429FF4B}" type="datetimeFigureOut">
               <a:rPr lang="en-US" smtClean="0"/>
-              <a:t>10-Dec-20</a:t>
+              <a:t>24/02/01</a:t>
             </a:fld>
             <a:endParaRPr lang="en-US"/>
           </a:p>
@@ -593,7 +594,7 @@
           <a:p>
             <a:fld id="{B0B69CF3-5B14-48D7-B161-C10A5429FF4B}" type="datetimeFigureOut">
               <a:rPr lang="en-US" smtClean="0"/>
-              <a:t>10-Dec-20</a:t>
+              <a:t>24/02/01</a:t>
             </a:fld>
             <a:endParaRPr lang="en-US"/>
           </a:p>
@@ -763,7 +764,7 @@
           <a:p>
             <a:fld id="{B0B69CF3-5B14-48D7-B161-C10A5429FF4B}" type="datetimeFigureOut">
               <a:rPr lang="en-US" smtClean="0"/>
-              <a:t>10-Dec-20</a:t>
+              <a:t>24/02/01</a:t>
             </a:fld>
             <a:endParaRPr lang="en-US"/>
           </a:p>
@@ -1007,7 +1008,7 @@
           <a:p>
             <a:fld id="{B0B69CF3-5B14-48D7-B161-C10A5429FF4B}" type="datetimeFigureOut">
               <a:rPr lang="en-US" smtClean="0"/>
-              <a:t>10-Dec-20</a:t>
+              <a:t>24/02/01</a:t>
             </a:fld>
             <a:endParaRPr lang="en-US"/>
           </a:p>
@@ -1239,7 +1240,7 @@
           <a:p>
             <a:fld id="{B0B69CF3-5B14-48D7-B161-C10A5429FF4B}" type="datetimeFigureOut">
               <a:rPr lang="en-US" smtClean="0"/>
-              <a:t>10-Dec-20</a:t>
+              <a:t>24/02/01</a:t>
             </a:fld>
             <a:endParaRPr lang="en-US"/>
           </a:p>
@@ -1606,7 +1607,7 @@
           <a:p>
             <a:fld id="{B0B69CF3-5B14-48D7-B161-C10A5429FF4B}" type="datetimeFigureOut">
               <a:rPr lang="en-US" smtClean="0"/>
-              <a:t>10-Dec-20</a:t>
+              <a:t>24/02/01</a:t>
             </a:fld>
             <a:endParaRPr lang="en-US"/>
           </a:p>
@@ -1724,7 +1725,7 @@
           <a:p>
             <a:fld id="{B0B69CF3-5B14-48D7-B161-C10A5429FF4B}" type="datetimeFigureOut">
               <a:rPr lang="en-US" smtClean="0"/>
-              <a:t>10-Dec-20</a:t>
+              <a:t>24/02/01</a:t>
             </a:fld>
             <a:endParaRPr lang="en-US"/>
           </a:p>
@@ -1819,7 +1820,7 @@
           <a:p>
             <a:fld id="{B0B69CF3-5B14-48D7-B161-C10A5429FF4B}" type="datetimeFigureOut">
               <a:rPr lang="en-US" smtClean="0"/>
-              <a:t>10-Dec-20</a:t>
+              <a:t>24/02/01</a:t>
             </a:fld>
             <a:endParaRPr lang="en-US"/>
           </a:p>
@@ -2096,7 +2097,7 @@
           <a:p>
             <a:fld id="{B0B69CF3-5B14-48D7-B161-C10A5429FF4B}" type="datetimeFigureOut">
               <a:rPr lang="en-US" smtClean="0"/>
-              <a:t>10-Dec-20</a:t>
+              <a:t>24/02/01</a:t>
             </a:fld>
             <a:endParaRPr lang="en-US"/>
           </a:p>
@@ -2353,7 +2354,7 @@
           <a:p>
             <a:fld id="{B0B69CF3-5B14-48D7-B161-C10A5429FF4B}" type="datetimeFigureOut">
               <a:rPr lang="en-US" smtClean="0"/>
-              <a:t>10-Dec-20</a:t>
+              <a:t>24/02/01</a:t>
             </a:fld>
             <a:endParaRPr lang="en-US"/>
           </a:p>
@@ -2566,7 +2567,7 @@
           <a:p>
             <a:fld id="{B0B69CF3-5B14-48D7-B161-C10A5429FF4B}" type="datetimeFigureOut">
               <a:rPr lang="en-US" smtClean="0"/>
-              <a:t>10-Dec-20</a:t>
+              <a:t>24/02/01</a:t>
             </a:fld>
             <a:endParaRPr lang="en-US"/>
           </a:p>
@@ -4389,6 +4390,1953 @@
 </p:sld>
 </file>
 
+<file path=ppt/slides/slide2.xml><?xml version="1.0" encoding="utf-8"?>
+<p:sld xmlns:a="http://schemas.openxmlformats.org/drawingml/2006/main" xmlns:r="http://schemas.openxmlformats.org/officeDocument/2006/relationships" xmlns:p="http://schemas.openxmlformats.org/presentationml/2006/main">
+  <p:cSld>
+    <p:spTree>
+      <p:nvGrpSpPr>
+        <p:cNvPr id="1" name=""/>
+        <p:cNvGrpSpPr/>
+        <p:nvPr/>
+      </p:nvGrpSpPr>
+      <p:grpSpPr>
+        <a:xfrm>
+          <a:off x="0" y="0"/>
+          <a:ext cx="0" cy="0"/>
+          <a:chOff x="0" y="0"/>
+          <a:chExt cx="0" cy="0"/>
+        </a:xfrm>
+      </p:grpSpPr>
+      <p:sp>
+        <p:nvSpPr>
+          <p:cNvPr id="2" name="Flowchart: Decision 1">
+            <a:extLst>
+              <a:ext uri="{FF2B5EF4-FFF2-40B4-BE49-F238E27FC236}">
+                <a16:creationId xmlns:a16="http://schemas.microsoft.com/office/drawing/2014/main" id="{5E87A7BA-D761-9BDE-33E1-2B6E1BB5E0A9}"/>
+              </a:ext>
+            </a:extLst>
+          </p:cNvPr>
+          <p:cNvSpPr/>
+          <p:nvPr/>
+        </p:nvSpPr>
+        <p:spPr>
+          <a:xfrm>
+            <a:off x="-7941028" y="970153"/>
+            <a:ext cx="3173736" cy="1888739"/>
+          </a:xfrm>
+          <a:prstGeom prst="flowChartDecision">
+            <a:avLst/>
+          </a:prstGeom>
+          <a:solidFill>
+            <a:schemeClr val="bg1"/>
+          </a:solidFill>
+          <a:ln>
+            <a:solidFill>
+              <a:schemeClr val="tx1"/>
+            </a:solidFill>
+          </a:ln>
+        </p:spPr>
+        <p:style>
+          <a:lnRef idx="2">
+            <a:schemeClr val="accent1">
+              <a:shade val="50000"/>
+            </a:schemeClr>
+          </a:lnRef>
+          <a:fillRef idx="1">
+            <a:schemeClr val="accent1"/>
+          </a:fillRef>
+          <a:effectRef idx="0">
+            <a:schemeClr val="accent1"/>
+          </a:effectRef>
+          <a:fontRef idx="minor">
+            <a:schemeClr val="lt1"/>
+          </a:fontRef>
+        </p:style>
+        <p:txBody>
+          <a:bodyPr wrap="none" lIns="0" tIns="0" rIns="0" bIns="0" rtlCol="0" anchor="ctr">
+            <a:noAutofit/>
+          </a:bodyPr>
+          <a:lstStyle/>
+          <a:p>
+            <a:pPr algn="ctr"/>
+            <a:r>
+              <a:rPr lang="en-US" sz="2400" dirty="0">
+                <a:solidFill>
+                  <a:schemeClr val="tx1"/>
+                </a:solidFill>
+              </a:rPr>
+              <a:t>Display has</a:t>
+            </a:r>
+          </a:p>
+          <a:p>
+            <a:pPr algn="ctr"/>
+            <a:r>
+              <a:rPr lang="en-US" sz="2400" dirty="0">
+                <a:solidFill>
+                  <a:schemeClr val="tx1"/>
+                </a:solidFill>
+              </a:rPr>
+              <a:t>its own buffer</a:t>
+            </a:r>
+          </a:p>
+        </p:txBody>
+      </p:sp>
+      <p:sp>
+        <p:nvSpPr>
+          <p:cNvPr id="3" name="Flowchart: Decision 2">
+            <a:extLst>
+              <a:ext uri="{FF2B5EF4-FFF2-40B4-BE49-F238E27FC236}">
+                <a16:creationId xmlns:a16="http://schemas.microsoft.com/office/drawing/2014/main" id="{B7E397FE-3A82-1CAC-4755-A4C05B694185}"/>
+              </a:ext>
+            </a:extLst>
+          </p:cNvPr>
+          <p:cNvSpPr/>
+          <p:nvPr/>
+        </p:nvSpPr>
+        <p:spPr>
+          <a:xfrm>
+            <a:off x="-1154393" y="9654650"/>
+            <a:ext cx="3173736" cy="1888739"/>
+          </a:xfrm>
+          <a:prstGeom prst="flowChartDecision">
+            <a:avLst/>
+          </a:prstGeom>
+          <a:solidFill>
+            <a:schemeClr val="bg1"/>
+          </a:solidFill>
+          <a:ln>
+            <a:solidFill>
+              <a:schemeClr val="tx1"/>
+            </a:solidFill>
+          </a:ln>
+        </p:spPr>
+        <p:style>
+          <a:lnRef idx="2">
+            <a:schemeClr val="accent1">
+              <a:shade val="50000"/>
+            </a:schemeClr>
+          </a:lnRef>
+          <a:fillRef idx="1">
+            <a:schemeClr val="accent1"/>
+          </a:fillRef>
+          <a:effectRef idx="0">
+            <a:schemeClr val="accent1"/>
+          </a:effectRef>
+          <a:fontRef idx="minor">
+            <a:schemeClr val="lt1"/>
+          </a:fontRef>
+        </p:style>
+        <p:txBody>
+          <a:bodyPr wrap="none" lIns="0" tIns="0" rIns="0" bIns="0" rtlCol="0" anchor="ctr">
+            <a:noAutofit/>
+          </a:bodyPr>
+          <a:lstStyle/>
+          <a:p>
+            <a:pPr algn="ctr"/>
+            <a:r>
+              <a:rPr lang="en-US" sz="2400" dirty="0">
+                <a:solidFill>
+                  <a:schemeClr val="tx1"/>
+                </a:solidFill>
+              </a:rPr>
+              <a:t>Display</a:t>
+            </a:r>
+          </a:p>
+          <a:p>
+            <a:pPr algn="ctr"/>
+            <a:r>
+              <a:rPr lang="en-US" sz="2400" dirty="0">
+                <a:solidFill>
+                  <a:schemeClr val="tx1"/>
+                </a:solidFill>
+              </a:rPr>
+              <a:t>buffer is mapped</a:t>
+            </a:r>
+          </a:p>
+          <a:p>
+            <a:pPr algn="ctr"/>
+            <a:r>
+              <a:rPr lang="en-US" sz="2400" dirty="0">
+                <a:solidFill>
+                  <a:schemeClr val="tx1"/>
+                </a:solidFill>
+              </a:rPr>
+              <a:t>to byte addressable</a:t>
+            </a:r>
+          </a:p>
+          <a:p>
+            <a:pPr algn="ctr"/>
+            <a:r>
+              <a:rPr lang="en-US" sz="2400" dirty="0">
+                <a:solidFill>
+                  <a:schemeClr val="tx1"/>
+                </a:solidFill>
+              </a:rPr>
+              <a:t>RAM</a:t>
+            </a:r>
+          </a:p>
+        </p:txBody>
+      </p:sp>
+      <p:sp>
+        <p:nvSpPr>
+          <p:cNvPr id="15" name="TextBox 14">
+            <a:extLst>
+              <a:ext uri="{FF2B5EF4-FFF2-40B4-BE49-F238E27FC236}">
+                <a16:creationId xmlns:a16="http://schemas.microsoft.com/office/drawing/2014/main" id="{142FF5E9-59A8-97A3-A048-620D8AFCE350}"/>
+              </a:ext>
+            </a:extLst>
+          </p:cNvPr>
+          <p:cNvSpPr txBox="1"/>
+          <p:nvPr/>
+        </p:nvSpPr>
+        <p:spPr>
+          <a:xfrm>
+            <a:off x="-6042657" y="3268377"/>
+            <a:ext cx="609600" cy="369332"/>
+          </a:xfrm>
+          <a:prstGeom prst="rect">
+            <a:avLst/>
+          </a:prstGeom>
+          <a:noFill/>
+        </p:spPr>
+        <p:txBody>
+          <a:bodyPr wrap="square" rtlCol="0">
+            <a:spAutoFit/>
+          </a:bodyPr>
+          <a:lstStyle/>
+          <a:p>
+            <a:r>
+              <a:rPr lang="en-US" dirty="0"/>
+              <a:t>YES</a:t>
+            </a:r>
+          </a:p>
+        </p:txBody>
+      </p:sp>
+      <p:sp>
+        <p:nvSpPr>
+          <p:cNvPr id="16" name="Flowchart: Decision 15">
+            <a:extLst>
+              <a:ext uri="{FF2B5EF4-FFF2-40B4-BE49-F238E27FC236}">
+                <a16:creationId xmlns:a16="http://schemas.microsoft.com/office/drawing/2014/main" id="{F54D052E-7504-6D46-FC51-5C6E07E89B81}"/>
+              </a:ext>
+            </a:extLst>
+          </p:cNvPr>
+          <p:cNvSpPr/>
+          <p:nvPr/>
+        </p:nvSpPr>
+        <p:spPr>
+          <a:xfrm>
+            <a:off x="-7941028" y="6279171"/>
+            <a:ext cx="3173736" cy="1888739"/>
+          </a:xfrm>
+          <a:prstGeom prst="flowChartDecision">
+            <a:avLst/>
+          </a:prstGeom>
+          <a:solidFill>
+            <a:schemeClr val="bg1"/>
+          </a:solidFill>
+          <a:ln>
+            <a:solidFill>
+              <a:schemeClr val="tx1"/>
+            </a:solidFill>
+          </a:ln>
+        </p:spPr>
+        <p:style>
+          <a:lnRef idx="2">
+            <a:schemeClr val="accent1">
+              <a:shade val="50000"/>
+            </a:schemeClr>
+          </a:lnRef>
+          <a:fillRef idx="1">
+            <a:schemeClr val="accent1"/>
+          </a:fillRef>
+          <a:effectRef idx="0">
+            <a:schemeClr val="accent1"/>
+          </a:effectRef>
+          <a:fontRef idx="minor">
+            <a:schemeClr val="lt1"/>
+          </a:fontRef>
+        </p:style>
+        <p:txBody>
+          <a:bodyPr wrap="none" lIns="0" tIns="0" rIns="0" bIns="0" rtlCol="0" anchor="ctr">
+            <a:noAutofit/>
+          </a:bodyPr>
+          <a:lstStyle/>
+          <a:p>
+            <a:pPr algn="ctr"/>
+            <a:r>
+              <a:rPr lang="en-US" sz="2400" dirty="0">
+                <a:solidFill>
+                  <a:schemeClr val="tx1"/>
+                </a:solidFill>
+              </a:rPr>
+              <a:t>Available RAM</a:t>
+            </a:r>
+          </a:p>
+          <a:p>
+            <a:pPr algn="ctr"/>
+            <a:r>
+              <a:rPr lang="en-US" sz="2400" dirty="0">
+                <a:solidFill>
+                  <a:schemeClr val="tx1"/>
+                </a:solidFill>
+              </a:rPr>
+              <a:t>for 1 buffer</a:t>
+            </a:r>
+          </a:p>
+        </p:txBody>
+      </p:sp>
+      <p:sp>
+        <p:nvSpPr>
+          <p:cNvPr id="18" name="Rectangle 17">
+            <a:extLst>
+              <a:ext uri="{FF2B5EF4-FFF2-40B4-BE49-F238E27FC236}">
+                <a16:creationId xmlns:a16="http://schemas.microsoft.com/office/drawing/2014/main" id="{B6909D59-011B-CE13-80CD-44E684F6FA49}"/>
+              </a:ext>
+            </a:extLst>
+          </p:cNvPr>
+          <p:cNvSpPr/>
+          <p:nvPr/>
+        </p:nvSpPr>
+        <p:spPr>
+          <a:xfrm>
+            <a:off x="-3583992" y="14850133"/>
+            <a:ext cx="2267339" cy="1064641"/>
+          </a:xfrm>
+          <a:prstGeom prst="rect">
+            <a:avLst/>
+          </a:prstGeom>
+          <a:solidFill>
+            <a:schemeClr val="bg1"/>
+          </a:solidFill>
+          <a:ln>
+            <a:solidFill>
+              <a:schemeClr val="tx1"/>
+            </a:solidFill>
+          </a:ln>
+        </p:spPr>
+        <p:style>
+          <a:lnRef idx="2">
+            <a:schemeClr val="accent1">
+              <a:shade val="50000"/>
+            </a:schemeClr>
+          </a:lnRef>
+          <a:fillRef idx="1">
+            <a:schemeClr val="accent1"/>
+          </a:fillRef>
+          <a:effectRef idx="0">
+            <a:schemeClr val="accent1"/>
+          </a:effectRef>
+          <a:fontRef idx="minor">
+            <a:schemeClr val="lt1"/>
+          </a:fontRef>
+        </p:style>
+        <p:txBody>
+          <a:bodyPr rtlCol="0" anchor="ctr"/>
+          <a:lstStyle/>
+          <a:p>
+            <a:pPr algn="ctr"/>
+            <a:r>
+              <a:rPr lang="en-US" sz="3600" dirty="0">
+                <a:solidFill>
+                  <a:schemeClr val="tx1"/>
+                </a:solidFill>
+              </a:rPr>
+              <a:t>Partial</a:t>
+            </a:r>
+          </a:p>
+        </p:txBody>
+      </p:sp>
+      <p:sp>
+        <p:nvSpPr>
+          <p:cNvPr id="20" name="Rectangle 19">
+            <a:extLst>
+              <a:ext uri="{FF2B5EF4-FFF2-40B4-BE49-F238E27FC236}">
+                <a16:creationId xmlns:a16="http://schemas.microsoft.com/office/drawing/2014/main" id="{9D649889-24E8-62E2-2B9C-F59A8A53AE9B}"/>
+              </a:ext>
+            </a:extLst>
+          </p:cNvPr>
+          <p:cNvSpPr/>
+          <p:nvPr/>
+        </p:nvSpPr>
+        <p:spPr>
+          <a:xfrm>
+            <a:off x="-7176326" y="14802591"/>
+            <a:ext cx="2267339" cy="1064640"/>
+          </a:xfrm>
+          <a:prstGeom prst="rect">
+            <a:avLst/>
+          </a:prstGeom>
+          <a:solidFill>
+            <a:schemeClr val="bg1"/>
+          </a:solidFill>
+          <a:ln>
+            <a:solidFill>
+              <a:schemeClr val="tx1"/>
+            </a:solidFill>
+          </a:ln>
+        </p:spPr>
+        <p:style>
+          <a:lnRef idx="2">
+            <a:schemeClr val="accent1">
+              <a:shade val="50000"/>
+            </a:schemeClr>
+          </a:lnRef>
+          <a:fillRef idx="1">
+            <a:schemeClr val="accent1"/>
+          </a:fillRef>
+          <a:effectRef idx="0">
+            <a:schemeClr val="accent1"/>
+          </a:effectRef>
+          <a:fontRef idx="minor">
+            <a:schemeClr val="lt1"/>
+          </a:fontRef>
+        </p:style>
+        <p:txBody>
+          <a:bodyPr rtlCol="0" anchor="ctr"/>
+          <a:lstStyle/>
+          <a:p>
+            <a:pPr algn="ctr"/>
+            <a:r>
+              <a:rPr lang="en-US" sz="3600" dirty="0">
+                <a:solidFill>
+                  <a:schemeClr val="tx1"/>
+                </a:solidFill>
+              </a:rPr>
+              <a:t>Copy / single</a:t>
+            </a:r>
+          </a:p>
+        </p:txBody>
+      </p:sp>
+      <p:sp>
+        <p:nvSpPr>
+          <p:cNvPr id="22" name="Rectangle 21">
+            <a:extLst>
+              <a:ext uri="{FF2B5EF4-FFF2-40B4-BE49-F238E27FC236}">
+                <a16:creationId xmlns:a16="http://schemas.microsoft.com/office/drawing/2014/main" id="{1C9B1FF6-08E9-BBFD-FEDC-D0D95C17E73A}"/>
+              </a:ext>
+            </a:extLst>
+          </p:cNvPr>
+          <p:cNvSpPr/>
+          <p:nvPr/>
+        </p:nvSpPr>
+        <p:spPr>
+          <a:xfrm>
+            <a:off x="2702284" y="14790919"/>
+            <a:ext cx="2267339" cy="1064641"/>
+          </a:xfrm>
+          <a:prstGeom prst="rect">
+            <a:avLst/>
+          </a:prstGeom>
+          <a:solidFill>
+            <a:schemeClr val="bg1"/>
+          </a:solidFill>
+          <a:ln>
+            <a:solidFill>
+              <a:schemeClr val="tx1"/>
+            </a:solidFill>
+          </a:ln>
+        </p:spPr>
+        <p:style>
+          <a:lnRef idx="2">
+            <a:schemeClr val="accent1">
+              <a:shade val="50000"/>
+            </a:schemeClr>
+          </a:lnRef>
+          <a:fillRef idx="1">
+            <a:schemeClr val="accent1"/>
+          </a:fillRef>
+          <a:effectRef idx="0">
+            <a:schemeClr val="accent1"/>
+          </a:effectRef>
+          <a:fontRef idx="minor">
+            <a:schemeClr val="lt1"/>
+          </a:fontRef>
+        </p:style>
+        <p:txBody>
+          <a:bodyPr rtlCol="0" anchor="ctr"/>
+          <a:lstStyle/>
+          <a:p>
+            <a:pPr algn="ctr"/>
+            <a:r>
+              <a:rPr lang="en-US" sz="3600" dirty="0">
+                <a:solidFill>
+                  <a:schemeClr val="tx1"/>
+                </a:solidFill>
+              </a:rPr>
+              <a:t>Custom</a:t>
+            </a:r>
+          </a:p>
+        </p:txBody>
+      </p:sp>
+      <p:sp>
+        <p:nvSpPr>
+          <p:cNvPr id="25" name="Flowchart: Decision 24">
+            <a:extLst>
+              <a:ext uri="{FF2B5EF4-FFF2-40B4-BE49-F238E27FC236}">
+                <a16:creationId xmlns:a16="http://schemas.microsoft.com/office/drawing/2014/main" id="{4891C6C4-A56D-FE09-5A92-951C3308D940}"/>
+              </a:ext>
+            </a:extLst>
+          </p:cNvPr>
+          <p:cNvSpPr/>
+          <p:nvPr/>
+        </p:nvSpPr>
+        <p:spPr>
+          <a:xfrm>
+            <a:off x="3280672" y="5566835"/>
+            <a:ext cx="3173736" cy="1888739"/>
+          </a:xfrm>
+          <a:prstGeom prst="flowChartDecision">
+            <a:avLst/>
+          </a:prstGeom>
+          <a:solidFill>
+            <a:schemeClr val="bg1"/>
+          </a:solidFill>
+          <a:ln>
+            <a:solidFill>
+              <a:schemeClr val="tx1"/>
+            </a:solidFill>
+          </a:ln>
+        </p:spPr>
+        <p:style>
+          <a:lnRef idx="2">
+            <a:schemeClr val="accent1">
+              <a:shade val="50000"/>
+            </a:schemeClr>
+          </a:lnRef>
+          <a:fillRef idx="1">
+            <a:schemeClr val="accent1"/>
+          </a:fillRef>
+          <a:effectRef idx="0">
+            <a:schemeClr val="accent1"/>
+          </a:effectRef>
+          <a:fontRef idx="minor">
+            <a:schemeClr val="lt1"/>
+          </a:fontRef>
+        </p:style>
+        <p:txBody>
+          <a:bodyPr wrap="none" lIns="0" tIns="0" rIns="0" bIns="0" rtlCol="0" anchor="ctr">
+            <a:noAutofit/>
+          </a:bodyPr>
+          <a:lstStyle/>
+          <a:p>
+            <a:pPr algn="ctr"/>
+            <a:r>
+              <a:rPr lang="en-US" sz="2400" dirty="0">
+                <a:solidFill>
+                  <a:schemeClr val="tx1"/>
+                </a:solidFill>
+              </a:rPr>
+              <a:t>Available RAM</a:t>
+            </a:r>
+          </a:p>
+          <a:p>
+            <a:pPr algn="ctr"/>
+            <a:r>
+              <a:rPr lang="en-US" sz="2400" dirty="0">
+                <a:solidFill>
+                  <a:schemeClr val="tx1"/>
+                </a:solidFill>
+              </a:rPr>
+              <a:t>for 2 buffers</a:t>
+            </a:r>
+          </a:p>
+        </p:txBody>
+      </p:sp>
+      <p:sp>
+        <p:nvSpPr>
+          <p:cNvPr id="45" name="Rectangle 44">
+            <a:extLst>
+              <a:ext uri="{FF2B5EF4-FFF2-40B4-BE49-F238E27FC236}">
+                <a16:creationId xmlns:a16="http://schemas.microsoft.com/office/drawing/2014/main" id="{651238C3-C3A4-A49B-C120-071969D800D7}"/>
+              </a:ext>
+            </a:extLst>
+          </p:cNvPr>
+          <p:cNvSpPr/>
+          <p:nvPr/>
+        </p:nvSpPr>
+        <p:spPr>
+          <a:xfrm>
+            <a:off x="5652564" y="14802590"/>
+            <a:ext cx="2267339" cy="1064639"/>
+          </a:xfrm>
+          <a:prstGeom prst="rect">
+            <a:avLst/>
+          </a:prstGeom>
+          <a:solidFill>
+            <a:schemeClr val="bg1"/>
+          </a:solidFill>
+          <a:ln>
+            <a:solidFill>
+              <a:schemeClr val="tx1"/>
+            </a:solidFill>
+          </a:ln>
+        </p:spPr>
+        <p:style>
+          <a:lnRef idx="2">
+            <a:schemeClr val="accent1">
+              <a:shade val="50000"/>
+            </a:schemeClr>
+          </a:lnRef>
+          <a:fillRef idx="1">
+            <a:schemeClr val="accent1"/>
+          </a:fillRef>
+          <a:effectRef idx="0">
+            <a:schemeClr val="accent1"/>
+          </a:effectRef>
+          <a:fontRef idx="minor">
+            <a:schemeClr val="lt1"/>
+          </a:fontRef>
+        </p:style>
+        <p:txBody>
+          <a:bodyPr rtlCol="0" anchor="ctr"/>
+          <a:lstStyle/>
+          <a:p>
+            <a:pPr algn="ctr"/>
+            <a:r>
+              <a:rPr lang="en-US" sz="3600" dirty="0">
+                <a:solidFill>
+                  <a:schemeClr val="tx1"/>
+                </a:solidFill>
+              </a:rPr>
+              <a:t>Switch triple</a:t>
+            </a:r>
+          </a:p>
+        </p:txBody>
+      </p:sp>
+      <p:cxnSp>
+        <p:nvCxnSpPr>
+          <p:cNvPr id="52" name="Straight Arrow Connector 51">
+            <a:extLst>
+              <a:ext uri="{FF2B5EF4-FFF2-40B4-BE49-F238E27FC236}">
+                <a16:creationId xmlns:a16="http://schemas.microsoft.com/office/drawing/2014/main" id="{80710B02-39AB-1556-52C0-455E3073668A}"/>
+              </a:ext>
+            </a:extLst>
+          </p:cNvPr>
+          <p:cNvCxnSpPr>
+            <a:cxnSpLocks/>
+            <a:stCxn id="2" idx="2"/>
+            <a:endCxn id="16" idx="0"/>
+          </p:cNvCxnSpPr>
+          <p:nvPr/>
+        </p:nvCxnSpPr>
+        <p:spPr>
+          <a:xfrm>
+            <a:off x="-6354160" y="2858892"/>
+            <a:ext cx="0" cy="3420279"/>
+          </a:xfrm>
+          <a:prstGeom prst="straightConnector1">
+            <a:avLst/>
+          </a:prstGeom>
+          <a:ln>
+            <a:tailEnd type="triangle"/>
+          </a:ln>
+        </p:spPr>
+        <p:style>
+          <a:lnRef idx="1">
+            <a:schemeClr val="accent1"/>
+          </a:lnRef>
+          <a:fillRef idx="0">
+            <a:schemeClr val="accent1"/>
+          </a:fillRef>
+          <a:effectRef idx="0">
+            <a:schemeClr val="accent1"/>
+          </a:effectRef>
+          <a:fontRef idx="minor">
+            <a:schemeClr val="tx1"/>
+          </a:fontRef>
+        </p:style>
+      </p:cxnSp>
+      <p:cxnSp>
+        <p:nvCxnSpPr>
+          <p:cNvPr id="55" name="Straight Arrow Connector 54">
+            <a:extLst>
+              <a:ext uri="{FF2B5EF4-FFF2-40B4-BE49-F238E27FC236}">
+                <a16:creationId xmlns:a16="http://schemas.microsoft.com/office/drawing/2014/main" id="{C590870E-E09B-6717-DBE2-3A671D0BD891}"/>
+              </a:ext>
+            </a:extLst>
+          </p:cNvPr>
+          <p:cNvCxnSpPr>
+            <a:cxnSpLocks/>
+            <a:stCxn id="2" idx="3"/>
+            <a:endCxn id="114" idx="0"/>
+          </p:cNvCxnSpPr>
+          <p:nvPr/>
+        </p:nvCxnSpPr>
+        <p:spPr>
+          <a:xfrm>
+            <a:off x="-4767292" y="1914523"/>
+            <a:ext cx="5035473" cy="944369"/>
+          </a:xfrm>
+          <a:prstGeom prst="straightConnector1">
+            <a:avLst/>
+          </a:prstGeom>
+          <a:ln>
+            <a:tailEnd type="triangle"/>
+          </a:ln>
+        </p:spPr>
+        <p:style>
+          <a:lnRef idx="1">
+            <a:schemeClr val="accent2"/>
+          </a:lnRef>
+          <a:fillRef idx="0">
+            <a:schemeClr val="accent2"/>
+          </a:fillRef>
+          <a:effectRef idx="0">
+            <a:schemeClr val="accent2"/>
+          </a:effectRef>
+          <a:fontRef idx="minor">
+            <a:schemeClr val="tx1"/>
+          </a:fontRef>
+        </p:style>
+      </p:cxnSp>
+      <p:sp>
+        <p:nvSpPr>
+          <p:cNvPr id="57" name="Rectangle 56">
+            <a:extLst>
+              <a:ext uri="{FF2B5EF4-FFF2-40B4-BE49-F238E27FC236}">
+                <a16:creationId xmlns:a16="http://schemas.microsoft.com/office/drawing/2014/main" id="{230502EE-DE00-A2EB-B393-2965A87D1B86}"/>
+              </a:ext>
+            </a:extLst>
+          </p:cNvPr>
+          <p:cNvSpPr/>
+          <p:nvPr/>
+        </p:nvSpPr>
+        <p:spPr>
+          <a:xfrm>
+            <a:off x="-412290" y="14790919"/>
+            <a:ext cx="2267339" cy="1064641"/>
+          </a:xfrm>
+          <a:prstGeom prst="rect">
+            <a:avLst/>
+          </a:prstGeom>
+          <a:solidFill>
+            <a:schemeClr val="bg1"/>
+          </a:solidFill>
+          <a:ln>
+            <a:solidFill>
+              <a:schemeClr val="tx1"/>
+            </a:solidFill>
+          </a:ln>
+        </p:spPr>
+        <p:style>
+          <a:lnRef idx="2">
+            <a:schemeClr val="accent1">
+              <a:shade val="50000"/>
+            </a:schemeClr>
+          </a:lnRef>
+          <a:fillRef idx="1">
+            <a:schemeClr val="accent1"/>
+          </a:fillRef>
+          <a:effectRef idx="0">
+            <a:schemeClr val="accent1"/>
+          </a:effectRef>
+          <a:fontRef idx="minor">
+            <a:schemeClr val="lt1"/>
+          </a:fontRef>
+        </p:style>
+        <p:txBody>
+          <a:bodyPr rtlCol="0" anchor="ctr"/>
+          <a:lstStyle/>
+          <a:p>
+            <a:pPr algn="ctr"/>
+            <a:r>
+              <a:rPr lang="en-US" sz="3600" dirty="0">
+                <a:solidFill>
+                  <a:schemeClr val="tx1"/>
+                </a:solidFill>
+              </a:rPr>
+              <a:t>Direct</a:t>
+            </a:r>
+          </a:p>
+        </p:txBody>
+      </p:sp>
+      <p:cxnSp>
+        <p:nvCxnSpPr>
+          <p:cNvPr id="62" name="Straight Arrow Connector 61">
+            <a:extLst>
+              <a:ext uri="{FF2B5EF4-FFF2-40B4-BE49-F238E27FC236}">
+                <a16:creationId xmlns:a16="http://schemas.microsoft.com/office/drawing/2014/main" id="{925E98C6-66A8-B047-BE15-FFC97361E362}"/>
+              </a:ext>
+            </a:extLst>
+          </p:cNvPr>
+          <p:cNvCxnSpPr>
+            <a:cxnSpLocks/>
+            <a:stCxn id="103" idx="3"/>
+            <a:endCxn id="20" idx="0"/>
+          </p:cNvCxnSpPr>
+          <p:nvPr/>
+        </p:nvCxnSpPr>
+        <p:spPr>
+          <a:xfrm>
+            <a:off x="-7176326" y="10197023"/>
+            <a:ext cx="1133670" cy="4605568"/>
+          </a:xfrm>
+          <a:prstGeom prst="straightConnector1">
+            <a:avLst/>
+          </a:prstGeom>
+          <a:ln>
+            <a:tailEnd type="triangle"/>
+          </a:ln>
+        </p:spPr>
+        <p:style>
+          <a:lnRef idx="1">
+            <a:schemeClr val="accent2"/>
+          </a:lnRef>
+          <a:fillRef idx="0">
+            <a:schemeClr val="accent2"/>
+          </a:fillRef>
+          <a:effectRef idx="0">
+            <a:schemeClr val="accent2"/>
+          </a:effectRef>
+          <a:fontRef idx="minor">
+            <a:schemeClr val="tx1"/>
+          </a:fontRef>
+        </p:style>
+      </p:cxnSp>
+      <p:cxnSp>
+        <p:nvCxnSpPr>
+          <p:cNvPr id="64" name="Straight Arrow Connector 63">
+            <a:extLst>
+              <a:ext uri="{FF2B5EF4-FFF2-40B4-BE49-F238E27FC236}">
+                <a16:creationId xmlns:a16="http://schemas.microsoft.com/office/drawing/2014/main" id="{5F26DA15-6FC5-4C89-2496-D6DC0A42FD29}"/>
+              </a:ext>
+            </a:extLst>
+          </p:cNvPr>
+          <p:cNvCxnSpPr>
+            <a:cxnSpLocks/>
+            <a:stCxn id="16" idx="3"/>
+            <a:endCxn id="84" idx="0"/>
+          </p:cNvCxnSpPr>
+          <p:nvPr/>
+        </p:nvCxnSpPr>
+        <p:spPr>
+          <a:xfrm>
+            <a:off x="-4767292" y="7223541"/>
+            <a:ext cx="2351570" cy="542370"/>
+          </a:xfrm>
+          <a:prstGeom prst="straightConnector1">
+            <a:avLst/>
+          </a:prstGeom>
+          <a:ln>
+            <a:tailEnd type="triangle"/>
+          </a:ln>
+        </p:spPr>
+        <p:style>
+          <a:lnRef idx="1">
+            <a:schemeClr val="accent2"/>
+          </a:lnRef>
+          <a:fillRef idx="0">
+            <a:schemeClr val="accent2"/>
+          </a:fillRef>
+          <a:effectRef idx="0">
+            <a:schemeClr val="accent2"/>
+          </a:effectRef>
+          <a:fontRef idx="minor">
+            <a:schemeClr val="tx1"/>
+          </a:fontRef>
+        </p:style>
+      </p:cxnSp>
+      <p:cxnSp>
+        <p:nvCxnSpPr>
+          <p:cNvPr id="68" name="Straight Arrow Connector 67">
+            <a:extLst>
+              <a:ext uri="{FF2B5EF4-FFF2-40B4-BE49-F238E27FC236}">
+                <a16:creationId xmlns:a16="http://schemas.microsoft.com/office/drawing/2014/main" id="{CD6070ED-7578-1C6E-3F13-A2EF8B710CA8}"/>
+              </a:ext>
+            </a:extLst>
+          </p:cNvPr>
+          <p:cNvCxnSpPr>
+            <a:stCxn id="3" idx="2"/>
+            <a:endCxn id="57" idx="0"/>
+          </p:cNvCxnSpPr>
+          <p:nvPr/>
+        </p:nvCxnSpPr>
+        <p:spPr>
+          <a:xfrm>
+            <a:off x="432475" y="11543389"/>
+            <a:ext cx="288905" cy="3247530"/>
+          </a:xfrm>
+          <a:prstGeom prst="straightConnector1">
+            <a:avLst/>
+          </a:prstGeom>
+          <a:ln>
+            <a:tailEnd type="triangle"/>
+          </a:ln>
+        </p:spPr>
+        <p:style>
+          <a:lnRef idx="1">
+            <a:schemeClr val="accent1"/>
+          </a:lnRef>
+          <a:fillRef idx="0">
+            <a:schemeClr val="accent1"/>
+          </a:fillRef>
+          <a:effectRef idx="0">
+            <a:schemeClr val="accent1"/>
+          </a:effectRef>
+          <a:fontRef idx="minor">
+            <a:schemeClr val="tx1"/>
+          </a:fontRef>
+        </p:style>
+      </p:cxnSp>
+      <p:cxnSp>
+        <p:nvCxnSpPr>
+          <p:cNvPr id="70" name="Straight Arrow Connector 69">
+            <a:extLst>
+              <a:ext uri="{FF2B5EF4-FFF2-40B4-BE49-F238E27FC236}">
+                <a16:creationId xmlns:a16="http://schemas.microsoft.com/office/drawing/2014/main" id="{F93BE2C2-8405-7347-7276-8EFCCCE4DB94}"/>
+              </a:ext>
+            </a:extLst>
+          </p:cNvPr>
+          <p:cNvCxnSpPr>
+            <a:stCxn id="3" idx="3"/>
+            <a:endCxn id="22" idx="0"/>
+          </p:cNvCxnSpPr>
+          <p:nvPr/>
+        </p:nvCxnSpPr>
+        <p:spPr>
+          <a:xfrm>
+            <a:off x="2019343" y="10599020"/>
+            <a:ext cx="1816611" cy="4191899"/>
+          </a:xfrm>
+          <a:prstGeom prst="straightConnector1">
+            <a:avLst/>
+          </a:prstGeom>
+          <a:ln>
+            <a:tailEnd type="triangle"/>
+          </a:ln>
+        </p:spPr>
+        <p:style>
+          <a:lnRef idx="1">
+            <a:schemeClr val="accent2"/>
+          </a:lnRef>
+          <a:fillRef idx="0">
+            <a:schemeClr val="accent2"/>
+          </a:fillRef>
+          <a:effectRef idx="0">
+            <a:schemeClr val="accent2"/>
+          </a:effectRef>
+          <a:fontRef idx="minor">
+            <a:schemeClr val="tx1"/>
+          </a:fontRef>
+        </p:style>
+      </p:cxnSp>
+      <p:sp>
+        <p:nvSpPr>
+          <p:cNvPr id="84" name="Flowchart: Decision 83">
+            <a:extLst>
+              <a:ext uri="{FF2B5EF4-FFF2-40B4-BE49-F238E27FC236}">
+                <a16:creationId xmlns:a16="http://schemas.microsoft.com/office/drawing/2014/main" id="{316CDC45-1F2A-64D5-B152-9FD3AC6C6F07}"/>
+              </a:ext>
+            </a:extLst>
+          </p:cNvPr>
+          <p:cNvSpPr/>
+          <p:nvPr/>
+        </p:nvSpPr>
+        <p:spPr>
+          <a:xfrm>
+            <a:off x="-4002590" y="7765911"/>
+            <a:ext cx="3173736" cy="1888739"/>
+          </a:xfrm>
+          <a:prstGeom prst="flowChartDecision">
+            <a:avLst/>
+          </a:prstGeom>
+          <a:solidFill>
+            <a:schemeClr val="bg1"/>
+          </a:solidFill>
+          <a:ln>
+            <a:solidFill>
+              <a:schemeClr val="tx1"/>
+            </a:solidFill>
+          </a:ln>
+        </p:spPr>
+        <p:style>
+          <a:lnRef idx="2">
+            <a:schemeClr val="accent1">
+              <a:shade val="50000"/>
+            </a:schemeClr>
+          </a:lnRef>
+          <a:fillRef idx="1">
+            <a:schemeClr val="accent1"/>
+          </a:fillRef>
+          <a:effectRef idx="0">
+            <a:schemeClr val="accent1"/>
+          </a:effectRef>
+          <a:fontRef idx="minor">
+            <a:schemeClr val="lt1"/>
+          </a:fontRef>
+        </p:style>
+        <p:txBody>
+          <a:bodyPr wrap="none" lIns="0" tIns="0" rIns="0" bIns="0" rtlCol="0" anchor="ctr">
+            <a:noAutofit/>
+          </a:bodyPr>
+          <a:lstStyle/>
+          <a:p>
+            <a:pPr algn="ctr"/>
+            <a:r>
+              <a:rPr lang="en-US" sz="2400" dirty="0">
+                <a:solidFill>
+                  <a:schemeClr val="tx1"/>
+                </a:solidFill>
+              </a:rPr>
+              <a:t>Available RAM</a:t>
+            </a:r>
+          </a:p>
+          <a:p>
+            <a:pPr algn="ctr"/>
+            <a:r>
+              <a:rPr lang="en-US" sz="2400" dirty="0">
+                <a:solidFill>
+                  <a:schemeClr val="tx1"/>
+                </a:solidFill>
+              </a:rPr>
+              <a:t>for 1 partial buffer</a:t>
+            </a:r>
+          </a:p>
+        </p:txBody>
+      </p:sp>
+      <p:cxnSp>
+        <p:nvCxnSpPr>
+          <p:cNvPr id="100" name="Straight Arrow Connector 99">
+            <a:extLst>
+              <a:ext uri="{FF2B5EF4-FFF2-40B4-BE49-F238E27FC236}">
+                <a16:creationId xmlns:a16="http://schemas.microsoft.com/office/drawing/2014/main" id="{BA97BBD4-31E8-2209-DB65-D9CCACC33CCA}"/>
+              </a:ext>
+            </a:extLst>
+          </p:cNvPr>
+          <p:cNvCxnSpPr>
+            <a:stCxn id="84" idx="3"/>
+            <a:endCxn id="3" idx="0"/>
+          </p:cNvCxnSpPr>
+          <p:nvPr/>
+        </p:nvCxnSpPr>
+        <p:spPr>
+          <a:xfrm>
+            <a:off x="-828854" y="8710281"/>
+            <a:ext cx="1261329" cy="944369"/>
+          </a:xfrm>
+          <a:prstGeom prst="straightConnector1">
+            <a:avLst/>
+          </a:prstGeom>
+          <a:ln>
+            <a:tailEnd type="triangle"/>
+          </a:ln>
+        </p:spPr>
+        <p:style>
+          <a:lnRef idx="1">
+            <a:schemeClr val="accent2"/>
+          </a:lnRef>
+          <a:fillRef idx="0">
+            <a:schemeClr val="accent2"/>
+          </a:fillRef>
+          <a:effectRef idx="0">
+            <a:schemeClr val="accent2"/>
+          </a:effectRef>
+          <a:fontRef idx="minor">
+            <a:schemeClr val="tx1"/>
+          </a:fontRef>
+        </p:style>
+      </p:cxnSp>
+      <p:cxnSp>
+        <p:nvCxnSpPr>
+          <p:cNvPr id="102" name="Straight Arrow Connector 101">
+            <a:extLst>
+              <a:ext uri="{FF2B5EF4-FFF2-40B4-BE49-F238E27FC236}">
+                <a16:creationId xmlns:a16="http://schemas.microsoft.com/office/drawing/2014/main" id="{F8726149-DED1-8616-B8D7-E3C7C3F9D1E0}"/>
+              </a:ext>
+            </a:extLst>
+          </p:cNvPr>
+          <p:cNvCxnSpPr>
+            <a:stCxn id="84" idx="2"/>
+            <a:endCxn id="18" idx="0"/>
+          </p:cNvCxnSpPr>
+          <p:nvPr/>
+        </p:nvCxnSpPr>
+        <p:spPr>
+          <a:xfrm flipH="1">
+            <a:off x="-2450322" y="9654650"/>
+            <a:ext cx="34600" cy="5195483"/>
+          </a:xfrm>
+          <a:prstGeom prst="straightConnector1">
+            <a:avLst/>
+          </a:prstGeom>
+          <a:ln>
+            <a:tailEnd type="triangle"/>
+          </a:ln>
+        </p:spPr>
+        <p:style>
+          <a:lnRef idx="1">
+            <a:schemeClr val="accent1"/>
+          </a:lnRef>
+          <a:fillRef idx="0">
+            <a:schemeClr val="accent1"/>
+          </a:fillRef>
+          <a:effectRef idx="0">
+            <a:schemeClr val="accent1"/>
+          </a:effectRef>
+          <a:fontRef idx="minor">
+            <a:schemeClr val="tx1"/>
+          </a:fontRef>
+        </p:style>
+      </p:cxnSp>
+      <p:sp>
+        <p:nvSpPr>
+          <p:cNvPr id="103" name="Flowchart: Decision 102">
+            <a:extLst>
+              <a:ext uri="{FF2B5EF4-FFF2-40B4-BE49-F238E27FC236}">
+                <a16:creationId xmlns:a16="http://schemas.microsoft.com/office/drawing/2014/main" id="{FE6D04DC-93B0-9543-275A-5C9FEC64A2EA}"/>
+              </a:ext>
+            </a:extLst>
+          </p:cNvPr>
+          <p:cNvSpPr/>
+          <p:nvPr/>
+        </p:nvSpPr>
+        <p:spPr>
+          <a:xfrm>
+            <a:off x="-10350062" y="9252653"/>
+            <a:ext cx="3173736" cy="1888739"/>
+          </a:xfrm>
+          <a:prstGeom prst="flowChartDecision">
+            <a:avLst/>
+          </a:prstGeom>
+          <a:solidFill>
+            <a:schemeClr val="bg1"/>
+          </a:solidFill>
+          <a:ln>
+            <a:solidFill>
+              <a:schemeClr val="tx1"/>
+            </a:solidFill>
+          </a:ln>
+        </p:spPr>
+        <p:style>
+          <a:lnRef idx="2">
+            <a:schemeClr val="accent1">
+              <a:shade val="50000"/>
+            </a:schemeClr>
+          </a:lnRef>
+          <a:fillRef idx="1">
+            <a:schemeClr val="accent1"/>
+          </a:fillRef>
+          <a:effectRef idx="0">
+            <a:schemeClr val="accent1"/>
+          </a:effectRef>
+          <a:fontRef idx="minor">
+            <a:schemeClr val="lt1"/>
+          </a:fontRef>
+        </p:style>
+        <p:txBody>
+          <a:bodyPr wrap="none" lIns="0" tIns="0" rIns="0" bIns="0" rtlCol="0" anchor="ctr">
+            <a:noAutofit/>
+          </a:bodyPr>
+          <a:lstStyle/>
+          <a:p>
+            <a:pPr algn="ctr"/>
+            <a:r>
+              <a:rPr lang="en-US" sz="2400" dirty="0">
+                <a:solidFill>
+                  <a:schemeClr val="tx1"/>
+                </a:solidFill>
+              </a:rPr>
+              <a:t>Available RAM</a:t>
+            </a:r>
+          </a:p>
+          <a:p>
+            <a:pPr algn="ctr"/>
+            <a:r>
+              <a:rPr lang="en-US" sz="2400" dirty="0">
+                <a:solidFill>
+                  <a:schemeClr val="tx1"/>
+                </a:solidFill>
+              </a:rPr>
+              <a:t>for 2 buffers</a:t>
+            </a:r>
+          </a:p>
+        </p:txBody>
+      </p:sp>
+      <p:cxnSp>
+        <p:nvCxnSpPr>
+          <p:cNvPr id="107" name="Straight Arrow Connector 106">
+            <a:extLst>
+              <a:ext uri="{FF2B5EF4-FFF2-40B4-BE49-F238E27FC236}">
+                <a16:creationId xmlns:a16="http://schemas.microsoft.com/office/drawing/2014/main" id="{6500A2C8-0873-EB3C-7B38-2994D3957715}"/>
+              </a:ext>
+            </a:extLst>
+          </p:cNvPr>
+          <p:cNvCxnSpPr>
+            <a:stCxn id="16" idx="2"/>
+            <a:endCxn id="103" idx="0"/>
+          </p:cNvCxnSpPr>
+          <p:nvPr/>
+        </p:nvCxnSpPr>
+        <p:spPr>
+          <a:xfrm flipH="1">
+            <a:off x="-8763194" y="8167910"/>
+            <a:ext cx="2409034" cy="1084743"/>
+          </a:xfrm>
+          <a:prstGeom prst="straightConnector1">
+            <a:avLst/>
+          </a:prstGeom>
+          <a:ln>
+            <a:tailEnd type="triangle"/>
+          </a:ln>
+        </p:spPr>
+        <p:style>
+          <a:lnRef idx="1">
+            <a:schemeClr val="accent1"/>
+          </a:lnRef>
+          <a:fillRef idx="0">
+            <a:schemeClr val="accent1"/>
+          </a:fillRef>
+          <a:effectRef idx="0">
+            <a:schemeClr val="accent1"/>
+          </a:effectRef>
+          <a:fontRef idx="minor">
+            <a:schemeClr val="tx1"/>
+          </a:fontRef>
+        </p:style>
+      </p:cxnSp>
+      <p:sp>
+        <p:nvSpPr>
+          <p:cNvPr id="109" name="Rectangle 108">
+            <a:extLst>
+              <a:ext uri="{FF2B5EF4-FFF2-40B4-BE49-F238E27FC236}">
+                <a16:creationId xmlns:a16="http://schemas.microsoft.com/office/drawing/2014/main" id="{015ABFE3-CBBF-4E5B-5021-D759D69A663A}"/>
+              </a:ext>
+            </a:extLst>
+          </p:cNvPr>
+          <p:cNvSpPr/>
+          <p:nvPr/>
+        </p:nvSpPr>
+        <p:spPr>
+          <a:xfrm>
+            <a:off x="-10577335" y="14802589"/>
+            <a:ext cx="2267339" cy="1064640"/>
+          </a:xfrm>
+          <a:prstGeom prst="rect">
+            <a:avLst/>
+          </a:prstGeom>
+          <a:solidFill>
+            <a:schemeClr val="bg1"/>
+          </a:solidFill>
+          <a:ln>
+            <a:solidFill>
+              <a:schemeClr val="tx1"/>
+            </a:solidFill>
+          </a:ln>
+        </p:spPr>
+        <p:style>
+          <a:lnRef idx="2">
+            <a:schemeClr val="accent1">
+              <a:shade val="50000"/>
+            </a:schemeClr>
+          </a:lnRef>
+          <a:fillRef idx="1">
+            <a:schemeClr val="accent1"/>
+          </a:fillRef>
+          <a:effectRef idx="0">
+            <a:schemeClr val="accent1"/>
+          </a:effectRef>
+          <a:fontRef idx="minor">
+            <a:schemeClr val="lt1"/>
+          </a:fontRef>
+        </p:style>
+        <p:txBody>
+          <a:bodyPr rtlCol="0" anchor="ctr"/>
+          <a:lstStyle/>
+          <a:p>
+            <a:pPr algn="ctr"/>
+            <a:r>
+              <a:rPr lang="en-US" sz="3600" dirty="0">
+                <a:solidFill>
+                  <a:schemeClr val="tx1"/>
+                </a:solidFill>
+              </a:rPr>
+              <a:t>Copy &amp; swap</a:t>
+            </a:r>
+          </a:p>
+        </p:txBody>
+      </p:sp>
+      <p:cxnSp>
+        <p:nvCxnSpPr>
+          <p:cNvPr id="111" name="Straight Arrow Connector 110">
+            <a:extLst>
+              <a:ext uri="{FF2B5EF4-FFF2-40B4-BE49-F238E27FC236}">
+                <a16:creationId xmlns:a16="http://schemas.microsoft.com/office/drawing/2014/main" id="{A2CE8D2A-C117-4A88-FA93-B15422C87759}"/>
+              </a:ext>
+            </a:extLst>
+          </p:cNvPr>
+          <p:cNvCxnSpPr>
+            <a:stCxn id="103" idx="2"/>
+            <a:endCxn id="109" idx="0"/>
+          </p:cNvCxnSpPr>
+          <p:nvPr/>
+        </p:nvCxnSpPr>
+        <p:spPr>
+          <a:xfrm flipH="1">
+            <a:off x="-9443665" y="11141392"/>
+            <a:ext cx="680471" cy="3661197"/>
+          </a:xfrm>
+          <a:prstGeom prst="straightConnector1">
+            <a:avLst/>
+          </a:prstGeom>
+          <a:ln>
+            <a:tailEnd type="triangle"/>
+          </a:ln>
+        </p:spPr>
+        <p:style>
+          <a:lnRef idx="1">
+            <a:schemeClr val="accent1"/>
+          </a:lnRef>
+          <a:fillRef idx="0">
+            <a:schemeClr val="accent1"/>
+          </a:fillRef>
+          <a:effectRef idx="0">
+            <a:schemeClr val="accent1"/>
+          </a:effectRef>
+          <a:fontRef idx="minor">
+            <a:schemeClr val="tx1"/>
+          </a:fontRef>
+        </p:style>
+      </p:cxnSp>
+      <p:sp>
+        <p:nvSpPr>
+          <p:cNvPr id="114" name="Flowchart: Decision 113">
+            <a:extLst>
+              <a:ext uri="{FF2B5EF4-FFF2-40B4-BE49-F238E27FC236}">
+                <a16:creationId xmlns:a16="http://schemas.microsoft.com/office/drawing/2014/main" id="{03343C81-D96E-3044-E740-6931EA653830}"/>
+              </a:ext>
+            </a:extLst>
+          </p:cNvPr>
+          <p:cNvSpPr/>
+          <p:nvPr/>
+        </p:nvSpPr>
+        <p:spPr>
+          <a:xfrm>
+            <a:off x="-1318687" y="2858892"/>
+            <a:ext cx="3173736" cy="1888739"/>
+          </a:xfrm>
+          <a:prstGeom prst="flowChartDecision">
+            <a:avLst/>
+          </a:prstGeom>
+          <a:solidFill>
+            <a:schemeClr val="bg1"/>
+          </a:solidFill>
+          <a:ln>
+            <a:solidFill>
+              <a:schemeClr val="tx1"/>
+            </a:solidFill>
+          </a:ln>
+        </p:spPr>
+        <p:style>
+          <a:lnRef idx="2">
+            <a:schemeClr val="accent1">
+              <a:shade val="50000"/>
+            </a:schemeClr>
+          </a:lnRef>
+          <a:fillRef idx="1">
+            <a:schemeClr val="accent1"/>
+          </a:fillRef>
+          <a:effectRef idx="0">
+            <a:schemeClr val="accent1"/>
+          </a:effectRef>
+          <a:fontRef idx="minor">
+            <a:schemeClr val="lt1"/>
+          </a:fontRef>
+        </p:style>
+        <p:txBody>
+          <a:bodyPr wrap="none" lIns="0" tIns="0" rIns="0" bIns="0" rtlCol="0" anchor="ctr">
+            <a:noAutofit/>
+          </a:bodyPr>
+          <a:lstStyle/>
+          <a:p>
+            <a:pPr algn="ctr"/>
+            <a:r>
+              <a:rPr lang="en-US" sz="2400" dirty="0">
+                <a:solidFill>
+                  <a:schemeClr val="tx1"/>
+                </a:solidFill>
+              </a:rPr>
+              <a:t>Display is able</a:t>
+            </a:r>
+          </a:p>
+          <a:p>
+            <a:pPr algn="ctr"/>
+            <a:r>
+              <a:rPr lang="en-US" sz="2400" dirty="0">
+                <a:solidFill>
+                  <a:schemeClr val="tx1"/>
+                </a:solidFill>
+              </a:rPr>
+              <a:t>to change its source</a:t>
+            </a:r>
+          </a:p>
+          <a:p>
+            <a:pPr algn="ctr"/>
+            <a:r>
+              <a:rPr lang="en-US" sz="2400" dirty="0">
+                <a:solidFill>
+                  <a:schemeClr val="tx1"/>
+                </a:solidFill>
+              </a:rPr>
+              <a:t>buffer address</a:t>
+            </a:r>
+          </a:p>
+        </p:txBody>
+      </p:sp>
+      <p:cxnSp>
+        <p:nvCxnSpPr>
+          <p:cNvPr id="117" name="Straight Arrow Connector 116">
+            <a:extLst>
+              <a:ext uri="{FF2B5EF4-FFF2-40B4-BE49-F238E27FC236}">
+                <a16:creationId xmlns:a16="http://schemas.microsoft.com/office/drawing/2014/main" id="{4A2B7B8F-7920-D1AA-26B4-BB6108747E5C}"/>
+              </a:ext>
+            </a:extLst>
+          </p:cNvPr>
+          <p:cNvCxnSpPr>
+            <a:cxnSpLocks/>
+            <a:stCxn id="114" idx="1"/>
+            <a:endCxn id="16" idx="0"/>
+          </p:cNvCxnSpPr>
+          <p:nvPr/>
+        </p:nvCxnSpPr>
+        <p:spPr>
+          <a:xfrm flipH="1">
+            <a:off x="-6354160" y="3803262"/>
+            <a:ext cx="5035473" cy="2475909"/>
+          </a:xfrm>
+          <a:prstGeom prst="straightConnector1">
+            <a:avLst/>
+          </a:prstGeom>
+          <a:ln>
+            <a:tailEnd type="triangle"/>
+          </a:ln>
+        </p:spPr>
+        <p:style>
+          <a:lnRef idx="1">
+            <a:schemeClr val="accent2"/>
+          </a:lnRef>
+          <a:fillRef idx="0">
+            <a:schemeClr val="accent2"/>
+          </a:fillRef>
+          <a:effectRef idx="0">
+            <a:schemeClr val="accent2"/>
+          </a:effectRef>
+          <a:fontRef idx="minor">
+            <a:schemeClr val="tx1"/>
+          </a:fontRef>
+        </p:style>
+      </p:cxnSp>
+      <p:cxnSp>
+        <p:nvCxnSpPr>
+          <p:cNvPr id="130" name="Straight Arrow Connector 129">
+            <a:extLst>
+              <a:ext uri="{FF2B5EF4-FFF2-40B4-BE49-F238E27FC236}">
+                <a16:creationId xmlns:a16="http://schemas.microsoft.com/office/drawing/2014/main" id="{2D6D4981-66E0-7EEC-9DDB-2A02C02F7D03}"/>
+              </a:ext>
+            </a:extLst>
+          </p:cNvPr>
+          <p:cNvCxnSpPr>
+            <a:cxnSpLocks/>
+            <a:stCxn id="25" idx="1"/>
+            <a:endCxn id="84" idx="0"/>
+          </p:cNvCxnSpPr>
+          <p:nvPr/>
+        </p:nvCxnSpPr>
+        <p:spPr>
+          <a:xfrm flipH="1">
+            <a:off x="-2415722" y="6511205"/>
+            <a:ext cx="5696394" cy="1254706"/>
+          </a:xfrm>
+          <a:prstGeom prst="straightConnector1">
+            <a:avLst/>
+          </a:prstGeom>
+          <a:ln>
+            <a:tailEnd type="triangle"/>
+          </a:ln>
+        </p:spPr>
+        <p:style>
+          <a:lnRef idx="1">
+            <a:schemeClr val="accent2"/>
+          </a:lnRef>
+          <a:fillRef idx="0">
+            <a:schemeClr val="accent2"/>
+          </a:fillRef>
+          <a:effectRef idx="0">
+            <a:schemeClr val="accent2"/>
+          </a:effectRef>
+          <a:fontRef idx="minor">
+            <a:schemeClr val="tx1"/>
+          </a:fontRef>
+        </p:style>
+      </p:cxnSp>
+      <p:sp>
+        <p:nvSpPr>
+          <p:cNvPr id="141" name="Flowchart: Decision 140">
+            <a:extLst>
+              <a:ext uri="{FF2B5EF4-FFF2-40B4-BE49-F238E27FC236}">
+                <a16:creationId xmlns:a16="http://schemas.microsoft.com/office/drawing/2014/main" id="{FB9F7519-A201-D3A4-C631-614B43EE4430}"/>
+              </a:ext>
+            </a:extLst>
+          </p:cNvPr>
+          <p:cNvSpPr/>
+          <p:nvPr/>
+        </p:nvSpPr>
+        <p:spPr>
+          <a:xfrm>
+            <a:off x="3208107" y="8308283"/>
+            <a:ext cx="3173736" cy="1888739"/>
+          </a:xfrm>
+          <a:prstGeom prst="flowChartDecision">
+            <a:avLst/>
+          </a:prstGeom>
+          <a:solidFill>
+            <a:schemeClr val="bg1"/>
+          </a:solidFill>
+          <a:ln>
+            <a:solidFill>
+              <a:schemeClr val="tx1"/>
+            </a:solidFill>
+          </a:ln>
+        </p:spPr>
+        <p:style>
+          <a:lnRef idx="2">
+            <a:schemeClr val="accent1">
+              <a:shade val="50000"/>
+            </a:schemeClr>
+          </a:lnRef>
+          <a:fillRef idx="1">
+            <a:schemeClr val="accent1"/>
+          </a:fillRef>
+          <a:effectRef idx="0">
+            <a:schemeClr val="accent1"/>
+          </a:effectRef>
+          <a:fontRef idx="minor">
+            <a:schemeClr val="lt1"/>
+          </a:fontRef>
+        </p:style>
+        <p:txBody>
+          <a:bodyPr wrap="none" lIns="0" tIns="0" rIns="0" bIns="0" rtlCol="0" anchor="ctr">
+            <a:noAutofit/>
+          </a:bodyPr>
+          <a:lstStyle/>
+          <a:p>
+            <a:pPr algn="ctr"/>
+            <a:r>
+              <a:rPr lang="en-US" sz="2400" dirty="0">
+                <a:solidFill>
+                  <a:schemeClr val="tx1"/>
+                </a:solidFill>
+              </a:rPr>
+              <a:t>Available RAM</a:t>
+            </a:r>
+          </a:p>
+          <a:p>
+            <a:pPr algn="ctr"/>
+            <a:r>
+              <a:rPr lang="en-US" sz="2400" dirty="0">
+                <a:solidFill>
+                  <a:schemeClr val="tx1"/>
+                </a:solidFill>
+              </a:rPr>
+              <a:t>for 3 buffers</a:t>
+            </a:r>
+          </a:p>
+        </p:txBody>
+      </p:sp>
+      <p:cxnSp>
+        <p:nvCxnSpPr>
+          <p:cNvPr id="142" name="Straight Arrow Connector 141">
+            <a:extLst>
+              <a:ext uri="{FF2B5EF4-FFF2-40B4-BE49-F238E27FC236}">
+                <a16:creationId xmlns:a16="http://schemas.microsoft.com/office/drawing/2014/main" id="{51A45FDE-EA29-12FB-3D13-6E8591FA20DA}"/>
+              </a:ext>
+            </a:extLst>
+          </p:cNvPr>
+          <p:cNvCxnSpPr>
+            <a:cxnSpLocks/>
+            <a:stCxn id="25" idx="2"/>
+            <a:endCxn id="141" idx="0"/>
+          </p:cNvCxnSpPr>
+          <p:nvPr/>
+        </p:nvCxnSpPr>
+        <p:spPr>
+          <a:xfrm flipH="1">
+            <a:off x="4794975" y="7455574"/>
+            <a:ext cx="72565" cy="852709"/>
+          </a:xfrm>
+          <a:prstGeom prst="straightConnector1">
+            <a:avLst/>
+          </a:prstGeom>
+          <a:ln>
+            <a:tailEnd type="triangle"/>
+          </a:ln>
+        </p:spPr>
+        <p:style>
+          <a:lnRef idx="1">
+            <a:schemeClr val="accent1"/>
+          </a:lnRef>
+          <a:fillRef idx="0">
+            <a:schemeClr val="accent1"/>
+          </a:fillRef>
+          <a:effectRef idx="0">
+            <a:schemeClr val="accent1"/>
+          </a:effectRef>
+          <a:fontRef idx="minor">
+            <a:schemeClr val="tx1"/>
+          </a:fontRef>
+        </p:style>
+      </p:cxnSp>
+      <p:sp>
+        <p:nvSpPr>
+          <p:cNvPr id="150" name="Rectangle 149">
+            <a:extLst>
+              <a:ext uri="{FF2B5EF4-FFF2-40B4-BE49-F238E27FC236}">
+                <a16:creationId xmlns:a16="http://schemas.microsoft.com/office/drawing/2014/main" id="{88387936-C1DC-7DD7-5858-D8F6D86F3928}"/>
+              </a:ext>
+            </a:extLst>
+          </p:cNvPr>
+          <p:cNvSpPr/>
+          <p:nvPr/>
+        </p:nvSpPr>
+        <p:spPr>
+          <a:xfrm>
+            <a:off x="8449264" y="14790919"/>
+            <a:ext cx="2267339" cy="1064639"/>
+          </a:xfrm>
+          <a:prstGeom prst="rect">
+            <a:avLst/>
+          </a:prstGeom>
+          <a:solidFill>
+            <a:schemeClr val="bg1"/>
+          </a:solidFill>
+          <a:ln>
+            <a:solidFill>
+              <a:schemeClr val="tx1"/>
+            </a:solidFill>
+          </a:ln>
+        </p:spPr>
+        <p:style>
+          <a:lnRef idx="2">
+            <a:schemeClr val="accent1">
+              <a:shade val="50000"/>
+            </a:schemeClr>
+          </a:lnRef>
+          <a:fillRef idx="1">
+            <a:schemeClr val="accent1"/>
+          </a:fillRef>
+          <a:effectRef idx="0">
+            <a:schemeClr val="accent1"/>
+          </a:effectRef>
+          <a:fontRef idx="minor">
+            <a:schemeClr val="lt1"/>
+          </a:fontRef>
+        </p:style>
+        <p:txBody>
+          <a:bodyPr rtlCol="0" anchor="ctr"/>
+          <a:lstStyle/>
+          <a:p>
+            <a:pPr algn="ctr"/>
+            <a:r>
+              <a:rPr lang="en-US" sz="3600" dirty="0">
+                <a:solidFill>
+                  <a:schemeClr val="tx1"/>
+                </a:solidFill>
+              </a:rPr>
+              <a:t>Switch double</a:t>
+            </a:r>
+          </a:p>
+        </p:txBody>
+      </p:sp>
+      <p:cxnSp>
+        <p:nvCxnSpPr>
+          <p:cNvPr id="151" name="Straight Arrow Connector 150">
+            <a:extLst>
+              <a:ext uri="{FF2B5EF4-FFF2-40B4-BE49-F238E27FC236}">
+                <a16:creationId xmlns:a16="http://schemas.microsoft.com/office/drawing/2014/main" id="{AC584238-CAF8-5581-C7FA-D8D73240E338}"/>
+              </a:ext>
+            </a:extLst>
+          </p:cNvPr>
+          <p:cNvCxnSpPr>
+            <a:cxnSpLocks/>
+            <a:stCxn id="141" idx="3"/>
+            <a:endCxn id="150" idx="0"/>
+          </p:cNvCxnSpPr>
+          <p:nvPr/>
+        </p:nvCxnSpPr>
+        <p:spPr>
+          <a:xfrm>
+            <a:off x="6381843" y="9252653"/>
+            <a:ext cx="3201091" cy="5538266"/>
+          </a:xfrm>
+          <a:prstGeom prst="straightConnector1">
+            <a:avLst/>
+          </a:prstGeom>
+          <a:ln>
+            <a:tailEnd type="triangle"/>
+          </a:ln>
+        </p:spPr>
+        <p:style>
+          <a:lnRef idx="1">
+            <a:schemeClr val="accent2"/>
+          </a:lnRef>
+          <a:fillRef idx="0">
+            <a:schemeClr val="accent2"/>
+          </a:fillRef>
+          <a:effectRef idx="0">
+            <a:schemeClr val="accent2"/>
+          </a:effectRef>
+          <a:fontRef idx="minor">
+            <a:schemeClr val="tx1"/>
+          </a:fontRef>
+        </p:style>
+      </p:cxnSp>
+      <p:cxnSp>
+        <p:nvCxnSpPr>
+          <p:cNvPr id="156" name="Straight Arrow Connector 155">
+            <a:extLst>
+              <a:ext uri="{FF2B5EF4-FFF2-40B4-BE49-F238E27FC236}">
+                <a16:creationId xmlns:a16="http://schemas.microsoft.com/office/drawing/2014/main" id="{719AF38E-CC1C-CCEA-2F00-22774B04790C}"/>
+              </a:ext>
+            </a:extLst>
+          </p:cNvPr>
+          <p:cNvCxnSpPr>
+            <a:cxnSpLocks/>
+            <a:stCxn id="114" idx="2"/>
+            <a:endCxn id="25" idx="0"/>
+          </p:cNvCxnSpPr>
+          <p:nvPr/>
+        </p:nvCxnSpPr>
+        <p:spPr>
+          <a:xfrm>
+            <a:off x="268181" y="4747631"/>
+            <a:ext cx="4599359" cy="819204"/>
+          </a:xfrm>
+          <a:prstGeom prst="straightConnector1">
+            <a:avLst/>
+          </a:prstGeom>
+          <a:ln>
+            <a:tailEnd type="triangle"/>
+          </a:ln>
+        </p:spPr>
+        <p:style>
+          <a:lnRef idx="1">
+            <a:schemeClr val="accent1"/>
+          </a:lnRef>
+          <a:fillRef idx="0">
+            <a:schemeClr val="accent1"/>
+          </a:fillRef>
+          <a:effectRef idx="0">
+            <a:schemeClr val="accent1"/>
+          </a:effectRef>
+          <a:fontRef idx="minor">
+            <a:schemeClr val="tx1"/>
+          </a:fontRef>
+        </p:style>
+      </p:cxnSp>
+      <p:cxnSp>
+        <p:nvCxnSpPr>
+          <p:cNvPr id="163" name="Straight Arrow Connector 162">
+            <a:extLst>
+              <a:ext uri="{FF2B5EF4-FFF2-40B4-BE49-F238E27FC236}">
+                <a16:creationId xmlns:a16="http://schemas.microsoft.com/office/drawing/2014/main" id="{03FC508B-0918-C228-FB25-A4E41D7FF2CF}"/>
+              </a:ext>
+            </a:extLst>
+          </p:cNvPr>
+          <p:cNvCxnSpPr>
+            <a:cxnSpLocks/>
+            <a:stCxn id="141" idx="2"/>
+            <a:endCxn id="45" idx="0"/>
+          </p:cNvCxnSpPr>
+          <p:nvPr/>
+        </p:nvCxnSpPr>
+        <p:spPr>
+          <a:xfrm>
+            <a:off x="4794975" y="10197022"/>
+            <a:ext cx="1991259" cy="4605568"/>
+          </a:xfrm>
+          <a:prstGeom prst="straightConnector1">
+            <a:avLst/>
+          </a:prstGeom>
+          <a:ln>
+            <a:tailEnd type="triangle"/>
+          </a:ln>
+        </p:spPr>
+        <p:style>
+          <a:lnRef idx="1">
+            <a:schemeClr val="accent1"/>
+          </a:lnRef>
+          <a:fillRef idx="0">
+            <a:schemeClr val="accent1"/>
+          </a:fillRef>
+          <a:effectRef idx="0">
+            <a:schemeClr val="accent1"/>
+          </a:effectRef>
+          <a:fontRef idx="minor">
+            <a:schemeClr val="tx1"/>
+          </a:fontRef>
+        </p:style>
+      </p:cxnSp>
+      <p:sp>
+        <p:nvSpPr>
+          <p:cNvPr id="167" name="Flowchart: Decision 166">
+            <a:extLst>
+              <a:ext uri="{FF2B5EF4-FFF2-40B4-BE49-F238E27FC236}">
+                <a16:creationId xmlns:a16="http://schemas.microsoft.com/office/drawing/2014/main" id="{B03E6B9D-2365-C660-B33F-E702AB1B8881}"/>
+              </a:ext>
+            </a:extLst>
+          </p:cNvPr>
+          <p:cNvSpPr/>
+          <p:nvPr/>
+        </p:nvSpPr>
+        <p:spPr>
+          <a:xfrm>
+            <a:off x="19063509" y="497968"/>
+            <a:ext cx="3173736" cy="1888739"/>
+          </a:xfrm>
+          <a:prstGeom prst="flowChartDecision">
+            <a:avLst/>
+          </a:prstGeom>
+          <a:solidFill>
+            <a:schemeClr val="bg1"/>
+          </a:solidFill>
+          <a:ln>
+            <a:solidFill>
+              <a:schemeClr val="tx1"/>
+            </a:solidFill>
+          </a:ln>
+        </p:spPr>
+        <p:style>
+          <a:lnRef idx="2">
+            <a:schemeClr val="accent1">
+              <a:shade val="50000"/>
+            </a:schemeClr>
+          </a:lnRef>
+          <a:fillRef idx="1">
+            <a:schemeClr val="accent1"/>
+          </a:fillRef>
+          <a:effectRef idx="0">
+            <a:schemeClr val="accent1"/>
+          </a:effectRef>
+          <a:fontRef idx="minor">
+            <a:schemeClr val="lt1"/>
+          </a:fontRef>
+        </p:style>
+        <p:txBody>
+          <a:bodyPr wrap="none" lIns="0" tIns="0" rIns="0" bIns="0" rtlCol="0" anchor="ctr">
+            <a:noAutofit/>
+          </a:bodyPr>
+          <a:lstStyle/>
+          <a:p>
+            <a:pPr algn="ctr"/>
+            <a:r>
+              <a:rPr lang="en-US" sz="2400" dirty="0">
+                <a:solidFill>
+                  <a:schemeClr val="tx1"/>
+                </a:solidFill>
+              </a:rPr>
+              <a:t>Available RAM</a:t>
+            </a:r>
+          </a:p>
+          <a:p>
+            <a:pPr algn="ctr"/>
+            <a:r>
+              <a:rPr lang="en-US" sz="2400" dirty="0">
+                <a:solidFill>
+                  <a:schemeClr val="tx1"/>
+                </a:solidFill>
+              </a:rPr>
+              <a:t>for 1 buffer</a:t>
+            </a:r>
+          </a:p>
+        </p:txBody>
+      </p:sp>
+      <p:sp>
+        <p:nvSpPr>
+          <p:cNvPr id="169" name="Flowchart: Decision 168">
+            <a:extLst>
+              <a:ext uri="{FF2B5EF4-FFF2-40B4-BE49-F238E27FC236}">
+                <a16:creationId xmlns:a16="http://schemas.microsoft.com/office/drawing/2014/main" id="{DF15DECC-01CB-9266-6624-6BE67120E904}"/>
+              </a:ext>
+            </a:extLst>
+          </p:cNvPr>
+          <p:cNvSpPr/>
+          <p:nvPr/>
+        </p:nvSpPr>
+        <p:spPr>
+          <a:xfrm>
+            <a:off x="23791626" y="2858891"/>
+            <a:ext cx="3173736" cy="1888739"/>
+          </a:xfrm>
+          <a:prstGeom prst="flowChartDecision">
+            <a:avLst/>
+          </a:prstGeom>
+          <a:solidFill>
+            <a:schemeClr val="bg1"/>
+          </a:solidFill>
+          <a:ln>
+            <a:solidFill>
+              <a:schemeClr val="tx1"/>
+            </a:solidFill>
+          </a:ln>
+        </p:spPr>
+        <p:style>
+          <a:lnRef idx="2">
+            <a:schemeClr val="accent1">
+              <a:shade val="50000"/>
+            </a:schemeClr>
+          </a:lnRef>
+          <a:fillRef idx="1">
+            <a:schemeClr val="accent1"/>
+          </a:fillRef>
+          <a:effectRef idx="0">
+            <a:schemeClr val="accent1"/>
+          </a:effectRef>
+          <a:fontRef idx="minor">
+            <a:schemeClr val="lt1"/>
+          </a:fontRef>
+        </p:style>
+        <p:txBody>
+          <a:bodyPr wrap="none" lIns="0" tIns="0" rIns="0" bIns="0" rtlCol="0" anchor="ctr">
+            <a:noAutofit/>
+          </a:bodyPr>
+          <a:lstStyle/>
+          <a:p>
+            <a:pPr algn="ctr"/>
+            <a:r>
+              <a:rPr lang="en-US" sz="2400" dirty="0">
+                <a:solidFill>
+                  <a:schemeClr val="tx1"/>
+                </a:solidFill>
+              </a:rPr>
+              <a:t>Display has</a:t>
+            </a:r>
+          </a:p>
+          <a:p>
+            <a:pPr algn="ctr"/>
+            <a:r>
+              <a:rPr lang="en-US" sz="2400" dirty="0">
+                <a:solidFill>
+                  <a:schemeClr val="tx1"/>
+                </a:solidFill>
+              </a:rPr>
+              <a:t>its own buffer</a:t>
+            </a:r>
+          </a:p>
+        </p:txBody>
+      </p:sp>
+    </p:spTree>
+    <p:extLst>
+      <p:ext uri="{BB962C8B-B14F-4D97-AF65-F5344CB8AC3E}">
+        <p14:creationId xmlns:p14="http://schemas.microsoft.com/office/powerpoint/2010/main" val="3751938758"/>
+      </p:ext>
+    </p:extLst>
+  </p:cSld>
+  <p:clrMapOvr>
+    <a:masterClrMapping/>
+  </p:clrMapOvr>
+</p:sld>
+</file>
+
 <file path=ppt/theme/theme1.xml><?xml version="1.0" encoding="utf-8"?>
 <a:theme xmlns:a="http://schemas.openxmlformats.org/drawingml/2006/main" name="Office Theme">
   <a:themeElements>

</xml_diff>